<commit_message>
Related: tdf#149971 avmedia: add doc model and render for crop of media objects
It is possible to provide an explicit preview of media objects since
commit ada59384bce2c02cc9cdb14bd41282f2be063900 (Related: tdf#149971
svx: support explicitly provided snapshots for media shapes,
2022-08-24), however they can't be cropped.

This means that media shapes from PPTX with cropping show unexpected
content and can also have a buggy aspect ratio.

Extend avmedia::MediaItem to store cropping and take it into account
when returning the preview bitmap in SdrMediaObj::getSnapshot(). PPTX
import works out of the box, as oox/ already tried to set a cropping
property on the media shape.

This is just the preview, the cropping of the video itself is not yet
implemented.

Change-Id: I8db3e0dcf252613d56eb0e6139adf097e53b15cc
Reviewed-on: https://gerrit.libreoffice.org/c/core/+/138808
Reviewed-by: Miklos Vajna <vmiklos@collabora.com>
Tested-by: Jenkins
</commit_message>
<xml_diff>
--- a/svx/qa/unit/data/video-snapshot.pptx
+++ b/svx/qa/unit/data/video-snapshot.pptx
@@ -104,6 +104,11 @@
       </a:defRPr>
     </a:lvl9pPr>
   </p:defaultTextStyle>
+  <p:extLst>
+    <p:ext uri="{EFAFB233-063F-42B5-8137-9DF3F51BA10A}">
+      <p15:sldGuideLst xmlns:p15="http://schemas.microsoft.com/office/powerpoint/2012/main"/>
+    </p:ext>
+  </p:extLst>
 </p:presentation>
 </file>
 
@@ -254,7 +259,7 @@
           <a:p>
             <a:fld id="{237F48F2-0BA9-4B21-94F5-E819CEC7BB76}" type="datetimeFigureOut">
               <a:rPr lang="en-US" smtClean="0"/>
-              <a:t>8/23/2022</a:t>
+              <a:t>8/25/2022</a:t>
             </a:fld>
             <a:endParaRPr lang="en-US"/>
           </a:p>
@@ -452,7 +457,7 @@
           <a:p>
             <a:fld id="{237F48F2-0BA9-4B21-94F5-E819CEC7BB76}" type="datetimeFigureOut">
               <a:rPr lang="en-US" smtClean="0"/>
-              <a:t>8/23/2022</a:t>
+              <a:t>8/25/2022</a:t>
             </a:fld>
             <a:endParaRPr lang="en-US"/>
           </a:p>
@@ -660,7 +665,7 @@
           <a:p>
             <a:fld id="{237F48F2-0BA9-4B21-94F5-E819CEC7BB76}" type="datetimeFigureOut">
               <a:rPr lang="en-US" smtClean="0"/>
-              <a:t>8/23/2022</a:t>
+              <a:t>8/25/2022</a:t>
             </a:fld>
             <a:endParaRPr lang="en-US"/>
           </a:p>
@@ -858,7 +863,7 @@
           <a:p>
             <a:fld id="{237F48F2-0BA9-4B21-94F5-E819CEC7BB76}" type="datetimeFigureOut">
               <a:rPr lang="en-US" smtClean="0"/>
-              <a:t>8/23/2022</a:t>
+              <a:t>8/25/2022</a:t>
             </a:fld>
             <a:endParaRPr lang="en-US"/>
           </a:p>
@@ -1133,7 +1138,7 @@
           <a:p>
             <a:fld id="{237F48F2-0BA9-4B21-94F5-E819CEC7BB76}" type="datetimeFigureOut">
               <a:rPr lang="en-US" smtClean="0"/>
-              <a:t>8/23/2022</a:t>
+              <a:t>8/25/2022</a:t>
             </a:fld>
             <a:endParaRPr lang="en-US"/>
           </a:p>
@@ -1398,7 +1403,7 @@
           <a:p>
             <a:fld id="{237F48F2-0BA9-4B21-94F5-E819CEC7BB76}" type="datetimeFigureOut">
               <a:rPr lang="en-US" smtClean="0"/>
-              <a:t>8/23/2022</a:t>
+              <a:t>8/25/2022</a:t>
             </a:fld>
             <a:endParaRPr lang="en-US"/>
           </a:p>
@@ -1810,7 +1815,7 @@
           <a:p>
             <a:fld id="{237F48F2-0BA9-4B21-94F5-E819CEC7BB76}" type="datetimeFigureOut">
               <a:rPr lang="en-US" smtClean="0"/>
-              <a:t>8/23/2022</a:t>
+              <a:t>8/25/2022</a:t>
             </a:fld>
             <a:endParaRPr lang="en-US"/>
           </a:p>
@@ -1951,7 +1956,7 @@
           <a:p>
             <a:fld id="{237F48F2-0BA9-4B21-94F5-E819CEC7BB76}" type="datetimeFigureOut">
               <a:rPr lang="en-US" smtClean="0"/>
-              <a:t>8/23/2022</a:t>
+              <a:t>8/25/2022</a:t>
             </a:fld>
             <a:endParaRPr lang="en-US"/>
           </a:p>
@@ -2064,7 +2069,7 @@
           <a:p>
             <a:fld id="{237F48F2-0BA9-4B21-94F5-E819CEC7BB76}" type="datetimeFigureOut">
               <a:rPr lang="en-US" smtClean="0"/>
-              <a:t>8/23/2022</a:t>
+              <a:t>8/25/2022</a:t>
             </a:fld>
             <a:endParaRPr lang="en-US"/>
           </a:p>
@@ -2375,7 +2380,7 @@
           <a:p>
             <a:fld id="{237F48F2-0BA9-4B21-94F5-E819CEC7BB76}" type="datetimeFigureOut">
               <a:rPr lang="en-US" smtClean="0"/>
-              <a:t>8/23/2022</a:t>
+              <a:t>8/25/2022</a:t>
             </a:fld>
             <a:endParaRPr lang="en-US"/>
           </a:p>
@@ -2663,7 +2668,7 @@
           <a:p>
             <a:fld id="{237F48F2-0BA9-4B21-94F5-E819CEC7BB76}" type="datetimeFigureOut">
               <a:rPr lang="en-US" smtClean="0"/>
-              <a:t>8/23/2022</a:t>
+              <a:t>8/25/2022</a:t>
             </a:fld>
             <a:endParaRPr lang="en-US"/>
           </a:p>
@@ -2904,7 +2909,7 @@
           <a:p>
             <a:fld id="{237F48F2-0BA9-4B21-94F5-E819CEC7BB76}" type="datetimeFigureOut">
               <a:rPr lang="en-US" smtClean="0"/>
-              <a:t>8/23/2022</a:t>
+              <a:t>8/25/2022</a:t>
             </a:fld>
             <a:endParaRPr lang="en-US"/>
           </a:p>
@@ -3343,16 +3348,15 @@
             </p:extLst>
           </p:nvPr>
         </p:nvPicPr>
-        <p:blipFill>
+        <p:blipFill rotWithShape="1">
           <a:blip r:embed="rId4"/>
-          <a:stretch>
-            <a:fillRect/>
-          </a:stretch>
+          <a:srcRect l="25000" r="25000"/>
+          <a:stretch/>
         </p:blipFill>
         <p:spPr>
           <a:xfrm>
-            <a:off x="3048000" y="1143000"/>
-            <a:ext cx="6096000" cy="4572000"/>
+            <a:off x="4661452" y="1143000"/>
+            <a:ext cx="2991678" cy="4572000"/>
           </a:xfrm>
           <a:prstGeom prst="rect">
             <a:avLst/>

</xml_diff>